<commit_message>
Added new SciDash record matrix figure
</commit_message>
<xml_diff>
--- a/2013-NSF-ABI/SciUnit Figures.pptx
+++ b/2013-NSF-ABI/SciUnit Figures.pptx
@@ -288,7 +288,7 @@
           <a:p>
             <a:fld id="{BD7F2CF1-C95F-064E-A893-2297C80680DB}" type="datetimeFigureOut">
               <a:rPr lang="en-US" smtClean="0"/>
-              <a:t>8/8/13</a:t>
+              <a:t>8/13/13</a:t>
             </a:fld>
             <a:endParaRPr lang="en-US"/>
           </a:p>
@@ -458,7 +458,7 @@
           <a:p>
             <a:fld id="{BD7F2CF1-C95F-064E-A893-2297C80680DB}" type="datetimeFigureOut">
               <a:rPr lang="en-US" smtClean="0"/>
-              <a:t>8/8/13</a:t>
+              <a:t>8/13/13</a:t>
             </a:fld>
             <a:endParaRPr lang="en-US"/>
           </a:p>
@@ -638,7 +638,7 @@
           <a:p>
             <a:fld id="{BD7F2CF1-C95F-064E-A893-2297C80680DB}" type="datetimeFigureOut">
               <a:rPr lang="en-US" smtClean="0"/>
-              <a:t>8/8/13</a:t>
+              <a:t>8/13/13</a:t>
             </a:fld>
             <a:endParaRPr lang="en-US"/>
           </a:p>
@@ -808,7 +808,7 @@
           <a:p>
             <a:fld id="{BD7F2CF1-C95F-064E-A893-2297C80680DB}" type="datetimeFigureOut">
               <a:rPr lang="en-US" smtClean="0"/>
-              <a:t>8/8/13</a:t>
+              <a:t>8/13/13</a:t>
             </a:fld>
             <a:endParaRPr lang="en-US"/>
           </a:p>
@@ -1054,7 +1054,7 @@
           <a:p>
             <a:fld id="{BD7F2CF1-C95F-064E-A893-2297C80680DB}" type="datetimeFigureOut">
               <a:rPr lang="en-US" smtClean="0"/>
-              <a:t>8/8/13</a:t>
+              <a:t>8/13/13</a:t>
             </a:fld>
             <a:endParaRPr lang="en-US"/>
           </a:p>
@@ -1342,7 +1342,7 @@
           <a:p>
             <a:fld id="{BD7F2CF1-C95F-064E-A893-2297C80680DB}" type="datetimeFigureOut">
               <a:rPr lang="en-US" smtClean="0"/>
-              <a:t>8/8/13</a:t>
+              <a:t>8/13/13</a:t>
             </a:fld>
             <a:endParaRPr lang="en-US"/>
           </a:p>
@@ -1764,7 +1764,7 @@
           <a:p>
             <a:fld id="{BD7F2CF1-C95F-064E-A893-2297C80680DB}" type="datetimeFigureOut">
               <a:rPr lang="en-US" smtClean="0"/>
-              <a:t>8/8/13</a:t>
+              <a:t>8/13/13</a:t>
             </a:fld>
             <a:endParaRPr lang="en-US"/>
           </a:p>
@@ -1882,7 +1882,7 @@
           <a:p>
             <a:fld id="{BD7F2CF1-C95F-064E-A893-2297C80680DB}" type="datetimeFigureOut">
               <a:rPr lang="en-US" smtClean="0"/>
-              <a:t>8/8/13</a:t>
+              <a:t>8/13/13</a:t>
             </a:fld>
             <a:endParaRPr lang="en-US"/>
           </a:p>
@@ -1977,7 +1977,7 @@
           <a:p>
             <a:fld id="{BD7F2CF1-C95F-064E-A893-2297C80680DB}" type="datetimeFigureOut">
               <a:rPr lang="en-US" smtClean="0"/>
-              <a:t>8/8/13</a:t>
+              <a:t>8/13/13</a:t>
             </a:fld>
             <a:endParaRPr lang="en-US"/>
           </a:p>
@@ -2254,7 +2254,7 @@
           <a:p>
             <a:fld id="{BD7F2CF1-C95F-064E-A893-2297C80680DB}" type="datetimeFigureOut">
               <a:rPr lang="en-US" smtClean="0"/>
-              <a:t>8/8/13</a:t>
+              <a:t>8/13/13</a:t>
             </a:fld>
             <a:endParaRPr lang="en-US"/>
           </a:p>
@@ -2507,7 +2507,7 @@
           <a:p>
             <a:fld id="{BD7F2CF1-C95F-064E-A893-2297C80680DB}" type="datetimeFigureOut">
               <a:rPr lang="en-US" smtClean="0"/>
-              <a:t>8/8/13</a:t>
+              <a:t>8/13/13</a:t>
             </a:fld>
             <a:endParaRPr lang="en-US"/>
           </a:p>
@@ -2720,7 +2720,7 @@
           <a:p>
             <a:fld id="{BD7F2CF1-C95F-064E-A893-2297C80680DB}" type="datetimeFigureOut">
               <a:rPr lang="en-US" smtClean="0"/>
-              <a:t>8/8/13</a:t>
+              <a:t>8/13/13</a:t>
             </a:fld>
             <a:endParaRPr lang="en-US"/>
           </a:p>
@@ -3095,412 +3095,9 @@
           <a:chExt cx="0" cy="0"/>
         </a:xfrm>
       </p:grpSpPr>
-      <p:sp>
-        <p:nvSpPr>
-          <p:cNvPr id="5" name="Rounded Rectangle 4"/>
-          <p:cNvSpPr/>
-          <p:nvPr/>
-        </p:nvSpPr>
-        <p:spPr>
-          <a:xfrm>
-            <a:off x="1223991" y="1444625"/>
-            <a:ext cx="2793998" cy="1087437"/>
-          </a:xfrm>
-          <a:prstGeom prst="roundRect">
-            <a:avLst/>
-          </a:prstGeom>
-        </p:spPr>
-        <p:style>
-          <a:lnRef idx="1">
-            <a:schemeClr val="accent1"/>
-          </a:lnRef>
-          <a:fillRef idx="3">
-            <a:schemeClr val="accent1"/>
-          </a:fillRef>
-          <a:effectRef idx="2">
-            <a:schemeClr val="accent1"/>
-          </a:effectRef>
-          <a:fontRef idx="minor">
-            <a:schemeClr val="lt1"/>
-          </a:fontRef>
-        </p:style>
-        <p:txBody>
-          <a:bodyPr rtlCol="0" anchor="b"/>
-          <a:lstStyle/>
-          <a:p>
-            <a:pPr algn="ctr"/>
-            <a:r>
-              <a:rPr lang="en-US" dirty="0" err="1" smtClean="0">
-                <a:solidFill>
-                  <a:schemeClr val="tx1"/>
-                </a:solidFill>
-                <a:latin typeface="Arial Narrow"/>
-                <a:cs typeface="Arial Narrow"/>
-              </a:rPr>
-              <a:t>SciUnit</a:t>
-            </a:r>
-            <a:endParaRPr lang="en-US" dirty="0">
-              <a:solidFill>
-                <a:schemeClr val="tx1"/>
-              </a:solidFill>
-              <a:latin typeface="Arial Narrow"/>
-              <a:cs typeface="Arial Narrow"/>
-            </a:endParaRPr>
-          </a:p>
-        </p:txBody>
-      </p:sp>
-      <p:sp>
-        <p:nvSpPr>
-          <p:cNvPr id="6" name="Rounded Rectangle 5"/>
-          <p:cNvSpPr/>
-          <p:nvPr/>
-        </p:nvSpPr>
-        <p:spPr>
-          <a:xfrm>
-            <a:off x="2136800" y="1603369"/>
-            <a:ext cx="881061" cy="484188"/>
-          </a:xfrm>
-          <a:prstGeom prst="roundRect">
-            <a:avLst/>
-          </a:prstGeom>
-          <a:solidFill>
-            <a:schemeClr val="accent2">
-              <a:lumMod val="60000"/>
-              <a:lumOff val="40000"/>
-            </a:schemeClr>
-          </a:solidFill>
-        </p:spPr>
-        <p:style>
-          <a:lnRef idx="1">
-            <a:schemeClr val="accent1"/>
-          </a:lnRef>
-          <a:fillRef idx="3">
-            <a:schemeClr val="accent1"/>
-          </a:fillRef>
-          <a:effectRef idx="2">
-            <a:schemeClr val="accent1"/>
-          </a:effectRef>
-          <a:fontRef idx="minor">
-            <a:schemeClr val="lt1"/>
-          </a:fontRef>
-        </p:style>
-        <p:txBody>
-          <a:bodyPr rtlCol="0" anchor="ctr"/>
-          <a:lstStyle/>
-          <a:p>
-            <a:pPr algn="ctr"/>
-            <a:r>
-              <a:rPr lang="en-US" sz="1000" b="1" dirty="0" err="1" smtClean="0">
-                <a:solidFill>
-                  <a:schemeClr val="tx1"/>
-                </a:solidFill>
-                <a:latin typeface="Arial Narrow"/>
-                <a:cs typeface="Arial Narrow"/>
-              </a:rPr>
-              <a:t>NeuroUnit</a:t>
-            </a:r>
-            <a:endParaRPr lang="en-US" sz="1000" b="1" dirty="0">
-              <a:solidFill>
-                <a:schemeClr val="tx1"/>
-              </a:solidFill>
-              <a:latin typeface="Arial Narrow"/>
-              <a:cs typeface="Arial Narrow"/>
-            </a:endParaRPr>
-          </a:p>
-        </p:txBody>
-      </p:sp>
-      <p:sp>
-        <p:nvSpPr>
-          <p:cNvPr id="7" name="Rounded Rectangle 6"/>
-          <p:cNvSpPr/>
-          <p:nvPr/>
-        </p:nvSpPr>
-        <p:spPr>
-          <a:xfrm>
-            <a:off x="1303364" y="1603369"/>
-            <a:ext cx="762000" cy="484188"/>
-          </a:xfrm>
-          <a:prstGeom prst="roundRect">
-            <a:avLst/>
-          </a:prstGeom>
-          <a:solidFill>
-            <a:schemeClr val="accent3">
-              <a:lumMod val="75000"/>
-            </a:schemeClr>
-          </a:solidFill>
-        </p:spPr>
-        <p:style>
-          <a:lnRef idx="1">
-            <a:schemeClr val="accent1"/>
-          </a:lnRef>
-          <a:fillRef idx="3">
-            <a:schemeClr val="accent1"/>
-          </a:fillRef>
-          <a:effectRef idx="2">
-            <a:schemeClr val="accent1"/>
-          </a:effectRef>
-          <a:fontRef idx="minor">
-            <a:schemeClr val="lt1"/>
-          </a:fontRef>
-        </p:style>
-        <p:txBody>
-          <a:bodyPr rtlCol="0" anchor="ctr"/>
-          <a:lstStyle/>
-          <a:p>
-            <a:pPr algn="ctr"/>
-            <a:r>
-              <a:rPr lang="en-US" sz="1000" dirty="0" err="1" smtClean="0">
-                <a:solidFill>
-                  <a:schemeClr val="tx1"/>
-                </a:solidFill>
-                <a:latin typeface="Arial Narrow"/>
-                <a:cs typeface="Arial Narrow"/>
-              </a:rPr>
-              <a:t>fMRIUnit</a:t>
-            </a:r>
-            <a:endParaRPr lang="en-US" sz="1000" dirty="0">
-              <a:solidFill>
-                <a:schemeClr val="tx1"/>
-              </a:solidFill>
-              <a:latin typeface="Arial Narrow"/>
-              <a:cs typeface="Arial Narrow"/>
-            </a:endParaRPr>
-          </a:p>
-        </p:txBody>
-      </p:sp>
-      <p:sp>
-        <p:nvSpPr>
-          <p:cNvPr id="8" name="Rounded Rectangle 7"/>
-          <p:cNvSpPr/>
-          <p:nvPr/>
-        </p:nvSpPr>
-        <p:spPr>
-          <a:xfrm>
-            <a:off x="3089303" y="1603369"/>
-            <a:ext cx="865193" cy="484188"/>
-          </a:xfrm>
-          <a:prstGeom prst="roundRect">
-            <a:avLst/>
-          </a:prstGeom>
-          <a:solidFill>
-            <a:schemeClr val="bg2">
-              <a:lumMod val="50000"/>
-            </a:schemeClr>
-          </a:solidFill>
-        </p:spPr>
-        <p:style>
-          <a:lnRef idx="1">
-            <a:schemeClr val="accent1"/>
-          </a:lnRef>
-          <a:fillRef idx="3">
-            <a:schemeClr val="accent1"/>
-          </a:fillRef>
-          <a:effectRef idx="2">
-            <a:schemeClr val="accent1"/>
-          </a:effectRef>
-          <a:fontRef idx="minor">
-            <a:schemeClr val="lt1"/>
-          </a:fontRef>
-        </p:style>
-        <p:txBody>
-          <a:bodyPr rtlCol="0" anchor="ctr"/>
-          <a:lstStyle/>
-          <a:p>
-            <a:pPr algn="ctr"/>
-            <a:r>
-              <a:rPr lang="en-US" sz="1000" dirty="0" err="1" smtClean="0">
-                <a:solidFill>
-                  <a:schemeClr val="tx1"/>
-                </a:solidFill>
-                <a:latin typeface="Arial Narrow"/>
-                <a:cs typeface="Arial Narrow"/>
-              </a:rPr>
-              <a:t>ProteinUnit</a:t>
-            </a:r>
-            <a:endParaRPr lang="en-US" sz="1000" dirty="0">
-              <a:solidFill>
-                <a:schemeClr val="tx1"/>
-              </a:solidFill>
-              <a:latin typeface="Arial Narrow"/>
-              <a:cs typeface="Arial Narrow"/>
-            </a:endParaRPr>
-          </a:p>
-        </p:txBody>
-      </p:sp>
-      <p:sp>
-        <p:nvSpPr>
-          <p:cNvPr id="10" name="Rounded Rectangle 9"/>
-          <p:cNvSpPr/>
-          <p:nvPr/>
-        </p:nvSpPr>
-        <p:spPr>
-          <a:xfrm>
-            <a:off x="1776353" y="872462"/>
-            <a:ext cx="1671862" cy="496751"/>
-          </a:xfrm>
-          <a:prstGeom prst="roundRect">
-            <a:avLst/>
-          </a:prstGeom>
-          <a:solidFill>
-            <a:schemeClr val="accent4">
-              <a:lumMod val="60000"/>
-              <a:lumOff val="40000"/>
-            </a:schemeClr>
-          </a:solidFill>
-        </p:spPr>
-        <p:style>
-          <a:lnRef idx="1">
-            <a:schemeClr val="accent1"/>
-          </a:lnRef>
-          <a:fillRef idx="3">
-            <a:schemeClr val="accent1"/>
-          </a:fillRef>
-          <a:effectRef idx="2">
-            <a:schemeClr val="accent1"/>
-          </a:effectRef>
-          <a:fontRef idx="minor">
-            <a:schemeClr val="lt1"/>
-          </a:fontRef>
-        </p:style>
-        <p:txBody>
-          <a:bodyPr rtlCol="0" anchor="ctr"/>
-          <a:lstStyle/>
-          <a:p>
-            <a:pPr algn="ctr"/>
-            <a:r>
-              <a:rPr lang="en-US" dirty="0" err="1" smtClean="0">
-                <a:solidFill>
-                  <a:schemeClr val="tx1"/>
-                </a:solidFill>
-                <a:latin typeface="Arial Narrow"/>
-                <a:cs typeface="Arial Narrow"/>
-              </a:rPr>
-              <a:t>SciDash</a:t>
-            </a:r>
-            <a:endParaRPr lang="en-US" dirty="0">
-              <a:solidFill>
-                <a:schemeClr val="tx1"/>
-              </a:solidFill>
-              <a:latin typeface="Arial Narrow"/>
-              <a:cs typeface="Arial Narrow"/>
-            </a:endParaRPr>
-          </a:p>
-        </p:txBody>
-      </p:sp>
-      <p:cxnSp>
-        <p:nvCxnSpPr>
-          <p:cNvPr id="12" name="Straight Arrow Connector 11"/>
-          <p:cNvCxnSpPr/>
-          <p:nvPr/>
-        </p:nvCxnSpPr>
-        <p:spPr>
-          <a:xfrm flipV="1">
-            <a:off x="1684364" y="1369213"/>
-            <a:ext cx="452436" cy="218280"/>
-          </a:xfrm>
-          <a:prstGeom prst="straightConnector1">
-            <a:avLst/>
-          </a:prstGeom>
-          <a:ln>
-            <a:solidFill>
-              <a:schemeClr val="tx1"/>
-            </a:solidFill>
-            <a:headEnd type="triangle"/>
-            <a:tailEnd type="none"/>
-          </a:ln>
-        </p:spPr>
-        <p:style>
-          <a:lnRef idx="2">
-            <a:schemeClr val="accent1"/>
-          </a:lnRef>
-          <a:fillRef idx="0">
-            <a:schemeClr val="accent1"/>
-          </a:fillRef>
-          <a:effectRef idx="1">
-            <a:schemeClr val="accent1"/>
-          </a:effectRef>
-          <a:fontRef idx="minor">
-            <a:schemeClr val="tx1"/>
-          </a:fontRef>
-        </p:style>
-      </p:cxnSp>
-      <p:cxnSp>
-        <p:nvCxnSpPr>
-          <p:cNvPr id="14" name="Straight Arrow Connector 13"/>
-          <p:cNvCxnSpPr/>
-          <p:nvPr/>
-        </p:nvCxnSpPr>
-        <p:spPr>
-          <a:xfrm flipV="1">
-            <a:off x="2579717" y="1369213"/>
-            <a:ext cx="0" cy="226216"/>
-          </a:xfrm>
-          <a:prstGeom prst="straightConnector1">
-            <a:avLst/>
-          </a:prstGeom>
-          <a:ln>
-            <a:solidFill>
-              <a:schemeClr val="tx1"/>
-            </a:solidFill>
-            <a:headEnd type="triangle"/>
-            <a:tailEnd type="none"/>
-          </a:ln>
-        </p:spPr>
-        <p:style>
-          <a:lnRef idx="2">
-            <a:schemeClr val="accent1"/>
-          </a:lnRef>
-          <a:fillRef idx="0">
-            <a:schemeClr val="accent1"/>
-          </a:fillRef>
-          <a:effectRef idx="1">
-            <a:schemeClr val="accent1"/>
-          </a:effectRef>
-          <a:fontRef idx="minor">
-            <a:schemeClr val="tx1"/>
-          </a:fontRef>
-        </p:style>
-      </p:cxnSp>
-      <p:cxnSp>
-        <p:nvCxnSpPr>
-          <p:cNvPr id="16" name="Straight Arrow Connector 15"/>
-          <p:cNvCxnSpPr/>
-          <p:nvPr/>
-        </p:nvCxnSpPr>
-        <p:spPr>
-          <a:xfrm flipH="1" flipV="1">
-            <a:off x="3017861" y="1369213"/>
-            <a:ext cx="488164" cy="226218"/>
-          </a:xfrm>
-          <a:prstGeom prst="straightConnector1">
-            <a:avLst/>
-          </a:prstGeom>
-          <a:ln>
-            <a:solidFill>
-              <a:schemeClr val="tx1"/>
-            </a:solidFill>
-            <a:headEnd type="triangle"/>
-            <a:tailEnd type="none"/>
-          </a:ln>
-        </p:spPr>
-        <p:style>
-          <a:lnRef idx="2">
-            <a:schemeClr val="accent1"/>
-          </a:lnRef>
-          <a:fillRef idx="0">
-            <a:schemeClr val="accent1"/>
-          </a:fillRef>
-          <a:effectRef idx="1">
-            <a:schemeClr val="accent1"/>
-          </a:effectRef>
-          <a:fontRef idx="minor">
-            <a:schemeClr val="tx1"/>
-          </a:fontRef>
-        </p:style>
-      </p:cxnSp>
       <p:pic>
         <p:nvPicPr>
-          <p:cNvPr id="27" name="Picture 26" descr="200235995-001.png"/>
+          <p:cNvPr id="25" name="Picture 24" descr="hp-server_749844.jpg"/>
           <p:cNvPicPr>
             <a:picLocks noChangeAspect="1"/>
           </p:cNvPicPr>
@@ -3520,17 +3117,388 @@
         </p:blipFill>
         <p:spPr>
           <a:xfrm>
-            <a:off x="889569" y="872653"/>
-            <a:ext cx="492007" cy="492007"/>
+            <a:off x="4388640" y="729799"/>
+            <a:ext cx="590456" cy="765997"/>
           </a:xfrm>
           <a:prstGeom prst="rect">
             <a:avLst/>
           </a:prstGeom>
         </p:spPr>
       </p:pic>
+      <p:sp>
+        <p:nvSpPr>
+          <p:cNvPr id="5" name="Rounded Rectangle 4"/>
+          <p:cNvSpPr/>
+          <p:nvPr/>
+        </p:nvSpPr>
+        <p:spPr>
+          <a:xfrm>
+            <a:off x="1223991" y="1587509"/>
+            <a:ext cx="2793998" cy="1087437"/>
+          </a:xfrm>
+          <a:prstGeom prst="roundRect">
+            <a:avLst/>
+          </a:prstGeom>
+        </p:spPr>
+        <p:style>
+          <a:lnRef idx="1">
+            <a:schemeClr val="accent1"/>
+          </a:lnRef>
+          <a:fillRef idx="3">
+            <a:schemeClr val="accent1"/>
+          </a:fillRef>
+          <a:effectRef idx="2">
+            <a:schemeClr val="accent1"/>
+          </a:effectRef>
+          <a:fontRef idx="minor">
+            <a:schemeClr val="lt1"/>
+          </a:fontRef>
+        </p:style>
+        <p:txBody>
+          <a:bodyPr rtlCol="0" anchor="b"/>
+          <a:lstStyle/>
+          <a:p>
+            <a:pPr algn="ctr"/>
+            <a:r>
+              <a:rPr lang="en-US" dirty="0" err="1" smtClean="0">
+                <a:solidFill>
+                  <a:schemeClr val="tx1"/>
+                </a:solidFill>
+                <a:latin typeface="Arial Narrow"/>
+                <a:cs typeface="Arial Narrow"/>
+              </a:rPr>
+              <a:t>SciUnit</a:t>
+            </a:r>
+            <a:endParaRPr lang="en-US" dirty="0">
+              <a:solidFill>
+                <a:schemeClr val="tx1"/>
+              </a:solidFill>
+              <a:latin typeface="Arial Narrow"/>
+              <a:cs typeface="Arial Narrow"/>
+            </a:endParaRPr>
+          </a:p>
+        </p:txBody>
+      </p:sp>
+      <p:sp>
+        <p:nvSpPr>
+          <p:cNvPr id="6" name="Rounded Rectangle 5"/>
+          <p:cNvSpPr/>
+          <p:nvPr/>
+        </p:nvSpPr>
+        <p:spPr>
+          <a:xfrm>
+            <a:off x="1889128" y="1730377"/>
+            <a:ext cx="825497" cy="484188"/>
+          </a:xfrm>
+          <a:prstGeom prst="roundRect">
+            <a:avLst/>
+          </a:prstGeom>
+          <a:solidFill>
+            <a:schemeClr val="accent2">
+              <a:lumMod val="60000"/>
+              <a:lumOff val="40000"/>
+            </a:schemeClr>
+          </a:solidFill>
+        </p:spPr>
+        <p:style>
+          <a:lnRef idx="1">
+            <a:schemeClr val="accent1"/>
+          </a:lnRef>
+          <a:fillRef idx="3">
+            <a:schemeClr val="accent1"/>
+          </a:fillRef>
+          <a:effectRef idx="2">
+            <a:schemeClr val="accent1"/>
+          </a:effectRef>
+          <a:fontRef idx="minor">
+            <a:schemeClr val="lt1"/>
+          </a:fontRef>
+        </p:style>
+        <p:txBody>
+          <a:bodyPr rtlCol="0" anchor="ctr"/>
+          <a:lstStyle/>
+          <a:p>
+            <a:pPr algn="ctr"/>
+            <a:r>
+              <a:rPr lang="en-US" sz="1000" b="1" dirty="0" err="1" smtClean="0">
+                <a:solidFill>
+                  <a:schemeClr val="tx1"/>
+                </a:solidFill>
+                <a:latin typeface="Arial Narrow"/>
+                <a:cs typeface="Arial Narrow"/>
+              </a:rPr>
+              <a:t>NeuronUnit</a:t>
+            </a:r>
+            <a:endParaRPr lang="en-US" sz="1000" b="1" dirty="0">
+              <a:solidFill>
+                <a:schemeClr val="tx1"/>
+              </a:solidFill>
+              <a:latin typeface="Arial Narrow"/>
+              <a:cs typeface="Arial Narrow"/>
+            </a:endParaRPr>
+          </a:p>
+        </p:txBody>
+      </p:sp>
+      <p:sp>
+        <p:nvSpPr>
+          <p:cNvPr id="7" name="Rounded Rectangle 6"/>
+          <p:cNvSpPr/>
+          <p:nvPr/>
+        </p:nvSpPr>
+        <p:spPr>
+          <a:xfrm>
+            <a:off x="1223991" y="1730377"/>
+            <a:ext cx="657199" cy="484188"/>
+          </a:xfrm>
+          <a:prstGeom prst="roundRect">
+            <a:avLst/>
+          </a:prstGeom>
+          <a:solidFill>
+            <a:schemeClr val="accent3">
+              <a:lumMod val="75000"/>
+            </a:schemeClr>
+          </a:solidFill>
+        </p:spPr>
+        <p:style>
+          <a:lnRef idx="1">
+            <a:schemeClr val="accent1"/>
+          </a:lnRef>
+          <a:fillRef idx="3">
+            <a:schemeClr val="accent1"/>
+          </a:fillRef>
+          <a:effectRef idx="2">
+            <a:schemeClr val="accent1"/>
+          </a:effectRef>
+          <a:fontRef idx="minor">
+            <a:schemeClr val="lt1"/>
+          </a:fontRef>
+        </p:style>
+        <p:txBody>
+          <a:bodyPr rtlCol="0" anchor="ctr"/>
+          <a:lstStyle/>
+          <a:p>
+            <a:pPr algn="ctr"/>
+            <a:r>
+              <a:rPr lang="en-US" sz="1000" dirty="0" err="1" smtClean="0">
+                <a:solidFill>
+                  <a:schemeClr val="tx1"/>
+                </a:solidFill>
+                <a:latin typeface="Arial Narrow"/>
+                <a:cs typeface="Arial Narrow"/>
+              </a:rPr>
+              <a:t>fMRIUnit</a:t>
+            </a:r>
+            <a:endParaRPr lang="en-US" sz="1000" dirty="0">
+              <a:solidFill>
+                <a:schemeClr val="tx1"/>
+              </a:solidFill>
+              <a:latin typeface="Arial Narrow"/>
+              <a:cs typeface="Arial Narrow"/>
+            </a:endParaRPr>
+          </a:p>
+        </p:txBody>
+      </p:sp>
+      <p:sp>
+        <p:nvSpPr>
+          <p:cNvPr id="8" name="Rounded Rectangle 7"/>
+          <p:cNvSpPr/>
+          <p:nvPr/>
+        </p:nvSpPr>
+        <p:spPr>
+          <a:xfrm>
+            <a:off x="2721821" y="1730377"/>
+            <a:ext cx="742270" cy="484188"/>
+          </a:xfrm>
+          <a:prstGeom prst="roundRect">
+            <a:avLst/>
+          </a:prstGeom>
+          <a:solidFill>
+            <a:schemeClr val="bg2">
+              <a:lumMod val="50000"/>
+            </a:schemeClr>
+          </a:solidFill>
+        </p:spPr>
+        <p:style>
+          <a:lnRef idx="1">
+            <a:schemeClr val="accent1"/>
+          </a:lnRef>
+          <a:fillRef idx="3">
+            <a:schemeClr val="accent1"/>
+          </a:fillRef>
+          <a:effectRef idx="2">
+            <a:schemeClr val="accent1"/>
+          </a:effectRef>
+          <a:fontRef idx="minor">
+            <a:schemeClr val="lt1"/>
+          </a:fontRef>
+        </p:style>
+        <p:txBody>
+          <a:bodyPr rtlCol="0" anchor="ctr"/>
+          <a:lstStyle/>
+          <a:p>
+            <a:pPr algn="ctr"/>
+            <a:r>
+              <a:rPr lang="en-US" sz="1000" dirty="0" err="1" smtClean="0">
+                <a:solidFill>
+                  <a:schemeClr val="tx1"/>
+                </a:solidFill>
+                <a:latin typeface="Arial Narrow"/>
+                <a:cs typeface="Arial Narrow"/>
+              </a:rPr>
+              <a:t>ProteinUnit</a:t>
+            </a:r>
+            <a:endParaRPr lang="en-US" sz="1000" dirty="0">
+              <a:solidFill>
+                <a:schemeClr val="tx1"/>
+              </a:solidFill>
+              <a:latin typeface="Arial Narrow"/>
+              <a:cs typeface="Arial Narrow"/>
+            </a:endParaRPr>
+          </a:p>
+        </p:txBody>
+      </p:sp>
+      <p:sp>
+        <p:nvSpPr>
+          <p:cNvPr id="10" name="Rounded Rectangle 9"/>
+          <p:cNvSpPr/>
+          <p:nvPr/>
+        </p:nvSpPr>
+        <p:spPr>
+          <a:xfrm>
+            <a:off x="1223991" y="476251"/>
+            <a:ext cx="2793998" cy="1087438"/>
+          </a:xfrm>
+          <a:prstGeom prst="roundRect">
+            <a:avLst/>
+          </a:prstGeom>
+          <a:solidFill>
+            <a:schemeClr val="accent4">
+              <a:lumMod val="60000"/>
+              <a:lumOff val="40000"/>
+            </a:schemeClr>
+          </a:solidFill>
+        </p:spPr>
+        <p:style>
+          <a:lnRef idx="1">
+            <a:schemeClr val="accent1"/>
+          </a:lnRef>
+          <a:fillRef idx="3">
+            <a:schemeClr val="accent1"/>
+          </a:fillRef>
+          <a:effectRef idx="2">
+            <a:schemeClr val="accent1"/>
+          </a:effectRef>
+          <a:fontRef idx="minor">
+            <a:schemeClr val="lt1"/>
+          </a:fontRef>
+        </p:style>
+        <p:txBody>
+          <a:bodyPr rtlCol="0" anchor="t"/>
+          <a:lstStyle/>
+          <a:p>
+            <a:pPr algn="ctr"/>
+            <a:r>
+              <a:rPr lang="en-US" dirty="0" err="1" smtClean="0">
+                <a:solidFill>
+                  <a:schemeClr val="tx1"/>
+                </a:solidFill>
+                <a:latin typeface="Arial Narrow"/>
+                <a:cs typeface="Arial Narrow"/>
+              </a:rPr>
+              <a:t>SciDash</a:t>
+            </a:r>
+            <a:endParaRPr lang="en-US" dirty="0">
+              <a:solidFill>
+                <a:schemeClr val="tx1"/>
+              </a:solidFill>
+              <a:latin typeface="Arial Narrow"/>
+              <a:cs typeface="Arial Narrow"/>
+            </a:endParaRPr>
+          </a:p>
+        </p:txBody>
+      </p:sp>
+      <p:cxnSp>
+        <p:nvCxnSpPr>
+          <p:cNvPr id="12" name="Straight Arrow Connector 11"/>
+          <p:cNvCxnSpPr>
+            <a:stCxn id="33" idx="2"/>
+            <a:endCxn id="7" idx="0"/>
+          </p:cNvCxnSpPr>
+          <p:nvPr/>
+        </p:nvCxnSpPr>
+        <p:spPr>
+          <a:xfrm>
+            <a:off x="1473217" y="1414630"/>
+            <a:ext cx="79374" cy="315747"/>
+          </a:xfrm>
+          <a:prstGeom prst="straightConnector1">
+            <a:avLst/>
+          </a:prstGeom>
+          <a:ln>
+            <a:solidFill>
+              <a:schemeClr val="tx1"/>
+            </a:solidFill>
+            <a:headEnd type="triangle"/>
+            <a:tailEnd type="none"/>
+          </a:ln>
+        </p:spPr>
+        <p:style>
+          <a:lnRef idx="2">
+            <a:schemeClr val="accent1"/>
+          </a:lnRef>
+          <a:fillRef idx="0">
+            <a:schemeClr val="accent1"/>
+          </a:fillRef>
+          <a:effectRef idx="1">
+            <a:schemeClr val="accent1"/>
+          </a:effectRef>
+          <a:fontRef idx="minor">
+            <a:schemeClr val="tx1"/>
+          </a:fontRef>
+        </p:style>
+      </p:cxnSp>
+      <p:cxnSp>
+        <p:nvCxnSpPr>
+          <p:cNvPr id="14" name="Straight Arrow Connector 13"/>
+          <p:cNvCxnSpPr>
+            <a:stCxn id="31" idx="2"/>
+          </p:cNvCxnSpPr>
+          <p:nvPr/>
+        </p:nvCxnSpPr>
+        <p:spPr>
+          <a:xfrm>
+            <a:off x="2016129" y="1422274"/>
+            <a:ext cx="47621" cy="303696"/>
+          </a:xfrm>
+          <a:prstGeom prst="straightConnector1">
+            <a:avLst/>
+          </a:prstGeom>
+          <a:ln>
+            <a:solidFill>
+              <a:schemeClr val="tx1"/>
+            </a:solidFill>
+            <a:headEnd type="triangle"/>
+            <a:tailEnd type="none"/>
+          </a:ln>
+        </p:spPr>
+        <p:style>
+          <a:lnRef idx="2">
+            <a:schemeClr val="accent1"/>
+          </a:lnRef>
+          <a:fillRef idx="0">
+            <a:schemeClr val="accent1"/>
+          </a:fillRef>
+          <a:effectRef idx="1">
+            <a:schemeClr val="accent1"/>
+          </a:effectRef>
+          <a:fontRef idx="minor">
+            <a:schemeClr val="tx1"/>
+          </a:fontRef>
+        </p:style>
+      </p:cxnSp>
       <p:pic>
         <p:nvPicPr>
-          <p:cNvPr id="28" name="Picture 27" descr="skd188257sdc.png"/>
+          <p:cNvPr id="27" name="Picture 26" descr="200235995-001.png"/>
           <p:cNvPicPr>
             <a:picLocks noChangeAspect="1"/>
           </p:cNvPicPr>
@@ -3550,8 +3518,8 @@
         </p:blipFill>
         <p:spPr>
           <a:xfrm>
-            <a:off x="4356488" y="1657848"/>
-            <a:ext cx="685573" cy="635007"/>
+            <a:off x="365810" y="779054"/>
+            <a:ext cx="492007" cy="492007"/>
           </a:xfrm>
           <a:prstGeom prst="rect">
             <a:avLst/>
@@ -3560,7 +3528,7 @@
       </p:pic>
       <p:pic>
         <p:nvPicPr>
-          <p:cNvPr id="3" name="Picture 2" descr="skd188803sdc.png"/>
+          <p:cNvPr id="28" name="Picture 27" descr="skd188257sdc.png"/>
           <p:cNvPicPr>
             <a:picLocks noChangeAspect="1"/>
           </p:cNvPicPr>
@@ -3580,8 +3548,8 @@
         </p:blipFill>
         <p:spPr>
           <a:xfrm>
-            <a:off x="3720333" y="856577"/>
-            <a:ext cx="595312" cy="492007"/>
+            <a:off x="4356488" y="1840422"/>
+            <a:ext cx="685573" cy="635007"/>
           </a:xfrm>
           <a:prstGeom prst="rect">
             <a:avLst/>
@@ -3610,7 +3578,7 @@
         </p:blipFill>
         <p:spPr>
           <a:xfrm>
-            <a:off x="394697" y="1523986"/>
+            <a:off x="394697" y="1785940"/>
             <a:ext cx="674387" cy="920763"/>
           </a:xfrm>
           <a:prstGeom prst="rect">
@@ -3621,14 +3589,12 @@
       <p:cxnSp>
         <p:nvCxnSpPr>
           <p:cNvPr id="11" name="Straight Arrow Connector 10"/>
-          <p:cNvCxnSpPr>
-            <a:endCxn id="5" idx="1"/>
-          </p:cNvCxnSpPr>
+          <p:cNvCxnSpPr/>
           <p:nvPr/>
         </p:nvCxnSpPr>
         <p:spPr>
           <a:xfrm>
-            <a:off x="920750" y="1988344"/>
+            <a:off x="920750" y="2250298"/>
             <a:ext cx="303241" cy="0"/>
           </a:xfrm>
           <a:prstGeom prst="straightConnector1">
@@ -3661,7 +3627,7 @@
         </p:nvSpPr>
         <p:spPr>
           <a:xfrm>
-            <a:off x="4058180" y="1649810"/>
+            <a:off x="4058180" y="1832384"/>
             <a:ext cx="338498" cy="155533"/>
           </a:xfrm>
           <a:custGeom>
@@ -3748,7 +3714,7 @@
         </p:nvSpPr>
         <p:spPr>
           <a:xfrm flipV="1">
-            <a:off x="4050142" y="2097039"/>
+            <a:off x="4050142" y="2279613"/>
             <a:ext cx="338498" cy="195816"/>
           </a:xfrm>
           <a:custGeom>
@@ -3836,7 +3802,7 @@
         </p:nvCxnSpPr>
         <p:spPr>
           <a:xfrm flipH="1">
-            <a:off x="1415906" y="1122750"/>
+            <a:off x="855606" y="1027494"/>
             <a:ext cx="360447" cy="0"/>
           </a:xfrm>
           <a:prstGeom prst="straightConnector1">
@@ -3863,14 +3829,74 @@
       </p:cxnSp>
       <p:sp>
         <p:nvSpPr>
-          <p:cNvPr id="20" name="Freeform 19"/>
+          <p:cNvPr id="22" name="Rounded Rectangle 21"/>
           <p:cNvSpPr/>
           <p:nvPr/>
         </p:nvSpPr>
         <p:spPr>
           <a:xfrm>
-            <a:off x="3495789" y="896767"/>
-            <a:ext cx="216506" cy="116347"/>
+            <a:off x="3472029" y="1725970"/>
+            <a:ext cx="545960" cy="484188"/>
+          </a:xfrm>
+          <a:prstGeom prst="roundRect">
+            <a:avLst/>
+          </a:prstGeom>
+          <a:solidFill>
+            <a:schemeClr val="accent3">
+              <a:lumMod val="40000"/>
+              <a:lumOff val="60000"/>
+            </a:schemeClr>
+          </a:solidFill>
+        </p:spPr>
+        <p:style>
+          <a:lnRef idx="1">
+            <a:schemeClr val="accent1"/>
+          </a:lnRef>
+          <a:fillRef idx="3">
+            <a:schemeClr val="accent1"/>
+          </a:fillRef>
+          <a:effectRef idx="2">
+            <a:schemeClr val="accent1"/>
+          </a:effectRef>
+          <a:fontRef idx="minor">
+            <a:schemeClr val="lt1"/>
+          </a:fontRef>
+        </p:style>
+        <p:txBody>
+          <a:bodyPr rtlCol="0" anchor="ctr"/>
+          <a:lstStyle/>
+          <a:p>
+            <a:pPr algn="ctr"/>
+            <a:r>
+              <a:rPr lang="en-US" sz="1000" dirty="0" smtClean="0">
+                <a:solidFill>
+                  <a:schemeClr val="tx1"/>
+                </a:solidFill>
+                <a:latin typeface="Arial Narrow"/>
+                <a:cs typeface="Arial Narrow"/>
+              </a:rPr>
+              <a:t>…</a:t>
+            </a:r>
+            <a:endParaRPr lang="en-US" sz="1000" dirty="0">
+              <a:solidFill>
+                <a:schemeClr val="tx1"/>
+              </a:solidFill>
+              <a:latin typeface="Arial Narrow"/>
+              <a:cs typeface="Arial Narrow"/>
+            </a:endParaRPr>
+          </a:p>
+        </p:txBody>
+      </p:sp>
+      <p:sp>
+        <p:nvSpPr>
+          <p:cNvPr id="29" name="Freeform 28"/>
+          <p:cNvSpPr/>
+          <p:nvPr/>
+        </p:nvSpPr>
+        <p:spPr>
+          <a:xfrm>
+            <a:off x="4066218" y="791445"/>
+            <a:ext cx="338498" cy="155533"/>
           </a:xfrm>
           <a:custGeom>
             <a:avLst/>
@@ -3950,14 +3976,14 @@
       </p:sp>
       <p:sp>
         <p:nvSpPr>
-          <p:cNvPr id="21" name="Freeform 20"/>
+          <p:cNvPr id="30" name="Freeform 29"/>
           <p:cNvSpPr/>
           <p:nvPr/>
         </p:nvSpPr>
         <p:spPr>
           <a:xfrm flipV="1">
-            <a:off x="3495789" y="1184240"/>
-            <a:ext cx="216506" cy="125876"/>
+            <a:off x="4058180" y="1238674"/>
+            <a:ext cx="338498" cy="195816"/>
           </a:xfrm>
           <a:custGeom>
             <a:avLst/>
@@ -4036,6 +4062,423 @@
           </a:p>
         </p:txBody>
       </p:sp>
+      <p:sp>
+        <p:nvSpPr>
+          <p:cNvPr id="31" name="Rounded Rectangle 30"/>
+          <p:cNvSpPr/>
+          <p:nvPr/>
+        </p:nvSpPr>
+        <p:spPr>
+          <a:xfrm>
+            <a:off x="1730380" y="938086"/>
+            <a:ext cx="571497" cy="484188"/>
+          </a:xfrm>
+          <a:prstGeom prst="roundRect">
+            <a:avLst/>
+          </a:prstGeom>
+          <a:solidFill>
+            <a:schemeClr val="accent2">
+              <a:lumMod val="60000"/>
+              <a:lumOff val="40000"/>
+            </a:schemeClr>
+          </a:solidFill>
+        </p:spPr>
+        <p:style>
+          <a:lnRef idx="1">
+            <a:schemeClr val="accent1"/>
+          </a:lnRef>
+          <a:fillRef idx="3">
+            <a:schemeClr val="accent1"/>
+          </a:fillRef>
+          <a:effectRef idx="2">
+            <a:schemeClr val="accent1"/>
+          </a:effectRef>
+          <a:fontRef idx="minor">
+            <a:schemeClr val="lt1"/>
+          </a:fontRef>
+        </p:style>
+        <p:txBody>
+          <a:bodyPr rtlCol="0" anchor="ctr"/>
+          <a:lstStyle/>
+          <a:p>
+            <a:pPr algn="ctr"/>
+            <a:r>
+              <a:rPr lang="en-US" sz="1000" b="1" dirty="0" smtClean="0">
+                <a:solidFill>
+                  <a:schemeClr val="tx1"/>
+                </a:solidFill>
+                <a:latin typeface="Arial Narrow"/>
+                <a:cs typeface="Arial Narrow"/>
+              </a:rPr>
+              <a:t>OSB</a:t>
+            </a:r>
+            <a:endParaRPr lang="en-US" sz="1000" b="1" dirty="0">
+              <a:solidFill>
+                <a:schemeClr val="tx1"/>
+              </a:solidFill>
+              <a:latin typeface="Arial Narrow"/>
+              <a:cs typeface="Arial Narrow"/>
+            </a:endParaRPr>
+          </a:p>
+        </p:txBody>
+      </p:sp>
+      <p:sp>
+        <p:nvSpPr>
+          <p:cNvPr id="32" name="Rounded Rectangle 31"/>
+          <p:cNvSpPr/>
+          <p:nvPr/>
+        </p:nvSpPr>
+        <p:spPr>
+          <a:xfrm>
+            <a:off x="2309815" y="938086"/>
+            <a:ext cx="682627" cy="484188"/>
+          </a:xfrm>
+          <a:prstGeom prst="roundRect">
+            <a:avLst/>
+          </a:prstGeom>
+          <a:solidFill>
+            <a:schemeClr val="accent2">
+              <a:lumMod val="60000"/>
+              <a:lumOff val="40000"/>
+            </a:schemeClr>
+          </a:solidFill>
+        </p:spPr>
+        <p:style>
+          <a:lnRef idx="1">
+            <a:schemeClr val="accent1"/>
+          </a:lnRef>
+          <a:fillRef idx="3">
+            <a:schemeClr val="accent1"/>
+          </a:fillRef>
+          <a:effectRef idx="2">
+            <a:schemeClr val="accent1"/>
+          </a:effectRef>
+          <a:fontRef idx="minor">
+            <a:schemeClr val="lt1"/>
+          </a:fontRef>
+        </p:style>
+        <p:txBody>
+          <a:bodyPr rtlCol="0" anchor="ctr"/>
+          <a:lstStyle/>
+          <a:p>
+            <a:pPr algn="ctr"/>
+            <a:r>
+              <a:rPr lang="en-US" sz="1000" b="1" dirty="0" smtClean="0">
+                <a:solidFill>
+                  <a:schemeClr val="tx1"/>
+                </a:solidFill>
+                <a:latin typeface="Arial Narrow"/>
+                <a:cs typeface="Arial Narrow"/>
+              </a:rPr>
+              <a:t>QSNMC</a:t>
+            </a:r>
+            <a:endParaRPr lang="en-US" sz="1000" b="1" dirty="0">
+              <a:solidFill>
+                <a:schemeClr val="tx1"/>
+              </a:solidFill>
+              <a:latin typeface="Arial Narrow"/>
+              <a:cs typeface="Arial Narrow"/>
+            </a:endParaRPr>
+          </a:p>
+        </p:txBody>
+      </p:sp>
+      <p:sp>
+        <p:nvSpPr>
+          <p:cNvPr id="33" name="Rounded Rectangle 32"/>
+          <p:cNvSpPr/>
+          <p:nvPr/>
+        </p:nvSpPr>
+        <p:spPr>
+          <a:xfrm>
+            <a:off x="1223991" y="930442"/>
+            <a:ext cx="498451" cy="484188"/>
+          </a:xfrm>
+          <a:prstGeom prst="roundRect">
+            <a:avLst/>
+          </a:prstGeom>
+          <a:solidFill>
+            <a:schemeClr val="accent3">
+              <a:lumMod val="75000"/>
+            </a:schemeClr>
+          </a:solidFill>
+        </p:spPr>
+        <p:style>
+          <a:lnRef idx="1">
+            <a:schemeClr val="accent1"/>
+          </a:lnRef>
+          <a:fillRef idx="3">
+            <a:schemeClr val="accent1"/>
+          </a:fillRef>
+          <a:effectRef idx="2">
+            <a:schemeClr val="accent1"/>
+          </a:effectRef>
+          <a:fontRef idx="minor">
+            <a:schemeClr val="lt1"/>
+          </a:fontRef>
+        </p:style>
+        <p:txBody>
+          <a:bodyPr rtlCol="0" anchor="ctr"/>
+          <a:lstStyle/>
+          <a:p>
+            <a:pPr algn="ctr"/>
+            <a:r>
+              <a:rPr lang="en-US" sz="1000" dirty="0" smtClean="0">
+                <a:solidFill>
+                  <a:schemeClr val="tx1"/>
+                </a:solidFill>
+                <a:latin typeface="Arial Narrow"/>
+                <a:cs typeface="Arial Narrow"/>
+              </a:rPr>
+              <a:t>…</a:t>
+            </a:r>
+            <a:endParaRPr lang="en-US" sz="1000" dirty="0">
+              <a:solidFill>
+                <a:schemeClr val="tx1"/>
+              </a:solidFill>
+              <a:latin typeface="Arial Narrow"/>
+              <a:cs typeface="Arial Narrow"/>
+            </a:endParaRPr>
+          </a:p>
+        </p:txBody>
+      </p:sp>
+      <p:sp>
+        <p:nvSpPr>
+          <p:cNvPr id="34" name="Rounded Rectangle 33"/>
+          <p:cNvSpPr/>
+          <p:nvPr/>
+        </p:nvSpPr>
+        <p:spPr>
+          <a:xfrm>
+            <a:off x="3540125" y="938086"/>
+            <a:ext cx="477864" cy="476544"/>
+          </a:xfrm>
+          <a:prstGeom prst="roundRect">
+            <a:avLst/>
+          </a:prstGeom>
+          <a:solidFill>
+            <a:schemeClr val="bg2">
+              <a:lumMod val="50000"/>
+            </a:schemeClr>
+          </a:solidFill>
+        </p:spPr>
+        <p:style>
+          <a:lnRef idx="1">
+            <a:schemeClr val="accent1"/>
+          </a:lnRef>
+          <a:fillRef idx="3">
+            <a:schemeClr val="accent1"/>
+          </a:fillRef>
+          <a:effectRef idx="2">
+            <a:schemeClr val="accent1"/>
+          </a:effectRef>
+          <a:fontRef idx="minor">
+            <a:schemeClr val="lt1"/>
+          </a:fontRef>
+        </p:style>
+        <p:txBody>
+          <a:bodyPr rtlCol="0" anchor="ctr"/>
+          <a:lstStyle/>
+          <a:p>
+            <a:pPr algn="ctr"/>
+            <a:r>
+              <a:rPr lang="en-US" sz="1000" dirty="0" smtClean="0">
+                <a:solidFill>
+                  <a:schemeClr val="tx1"/>
+                </a:solidFill>
+                <a:latin typeface="Arial Narrow"/>
+                <a:cs typeface="Arial Narrow"/>
+              </a:rPr>
+              <a:t>…</a:t>
+            </a:r>
+            <a:endParaRPr lang="en-US" sz="1000" dirty="0">
+              <a:solidFill>
+                <a:schemeClr val="tx1"/>
+              </a:solidFill>
+              <a:latin typeface="Arial Narrow"/>
+              <a:cs typeface="Arial Narrow"/>
+            </a:endParaRPr>
+          </a:p>
+        </p:txBody>
+      </p:sp>
+      <p:cxnSp>
+        <p:nvCxnSpPr>
+          <p:cNvPr id="39" name="Straight Arrow Connector 38"/>
+          <p:cNvCxnSpPr>
+            <a:stCxn id="32" idx="2"/>
+            <a:endCxn id="6" idx="0"/>
+          </p:cNvCxnSpPr>
+          <p:nvPr/>
+        </p:nvCxnSpPr>
+        <p:spPr>
+          <a:xfrm flipH="1">
+            <a:off x="2301877" y="1422274"/>
+            <a:ext cx="349252" cy="308103"/>
+          </a:xfrm>
+          <a:prstGeom prst="straightConnector1">
+            <a:avLst/>
+          </a:prstGeom>
+          <a:ln>
+            <a:solidFill>
+              <a:schemeClr val="tx1"/>
+            </a:solidFill>
+            <a:headEnd type="triangle"/>
+            <a:tailEnd type="none"/>
+          </a:ln>
+        </p:spPr>
+        <p:style>
+          <a:lnRef idx="2">
+            <a:schemeClr val="accent1"/>
+          </a:lnRef>
+          <a:fillRef idx="0">
+            <a:schemeClr val="accent1"/>
+          </a:fillRef>
+          <a:effectRef idx="1">
+            <a:schemeClr val="accent1"/>
+          </a:effectRef>
+          <a:fontRef idx="minor">
+            <a:schemeClr val="tx1"/>
+          </a:fontRef>
+        </p:style>
+      </p:cxnSp>
+      <p:sp>
+        <p:nvSpPr>
+          <p:cNvPr id="48" name="Rounded Rectangle 47"/>
+          <p:cNvSpPr/>
+          <p:nvPr/>
+        </p:nvSpPr>
+        <p:spPr>
+          <a:xfrm>
+            <a:off x="3000380" y="937670"/>
+            <a:ext cx="527215" cy="484188"/>
+          </a:xfrm>
+          <a:prstGeom prst="roundRect">
+            <a:avLst/>
+          </a:prstGeom>
+          <a:solidFill>
+            <a:schemeClr val="accent2">
+              <a:lumMod val="60000"/>
+              <a:lumOff val="40000"/>
+            </a:schemeClr>
+          </a:solidFill>
+        </p:spPr>
+        <p:style>
+          <a:lnRef idx="1">
+            <a:schemeClr val="accent1"/>
+          </a:lnRef>
+          <a:fillRef idx="3">
+            <a:schemeClr val="accent1"/>
+          </a:fillRef>
+          <a:effectRef idx="2">
+            <a:schemeClr val="accent1"/>
+          </a:effectRef>
+          <a:fontRef idx="minor">
+            <a:schemeClr val="lt1"/>
+          </a:fontRef>
+        </p:style>
+        <p:txBody>
+          <a:bodyPr rtlCol="0" anchor="ctr"/>
+          <a:lstStyle/>
+          <a:p>
+            <a:pPr algn="ctr"/>
+            <a:r>
+              <a:rPr lang="en-US" sz="1000" b="1" dirty="0" smtClean="0">
+                <a:solidFill>
+                  <a:schemeClr val="tx1"/>
+                </a:solidFill>
+                <a:latin typeface="Arial Narrow"/>
+                <a:cs typeface="Arial Narrow"/>
+              </a:rPr>
+              <a:t>…</a:t>
+            </a:r>
+            <a:endParaRPr lang="en-US" sz="1000" b="1" dirty="0">
+              <a:solidFill>
+                <a:schemeClr val="tx1"/>
+              </a:solidFill>
+              <a:latin typeface="Arial Narrow"/>
+              <a:cs typeface="Arial Narrow"/>
+            </a:endParaRPr>
+          </a:p>
+        </p:txBody>
+      </p:sp>
+      <p:cxnSp>
+        <p:nvCxnSpPr>
+          <p:cNvPr id="49" name="Straight Arrow Connector 48"/>
+          <p:cNvCxnSpPr>
+            <a:stCxn id="48" idx="2"/>
+          </p:cNvCxnSpPr>
+          <p:nvPr/>
+        </p:nvCxnSpPr>
+        <p:spPr>
+          <a:xfrm flipH="1">
+            <a:off x="2563813" y="1421858"/>
+            <a:ext cx="700175" cy="308519"/>
+          </a:xfrm>
+          <a:prstGeom prst="straightConnector1">
+            <a:avLst/>
+          </a:prstGeom>
+          <a:ln>
+            <a:solidFill>
+              <a:schemeClr val="tx1"/>
+            </a:solidFill>
+            <a:headEnd type="triangle"/>
+            <a:tailEnd type="none"/>
+          </a:ln>
+        </p:spPr>
+        <p:style>
+          <a:lnRef idx="2">
+            <a:schemeClr val="accent1"/>
+          </a:lnRef>
+          <a:fillRef idx="0">
+            <a:schemeClr val="accent1"/>
+          </a:fillRef>
+          <a:effectRef idx="1">
+            <a:schemeClr val="accent1"/>
+          </a:effectRef>
+          <a:fontRef idx="minor">
+            <a:schemeClr val="tx1"/>
+          </a:fontRef>
+        </p:style>
+      </p:cxnSp>
+      <p:cxnSp>
+        <p:nvCxnSpPr>
+          <p:cNvPr id="16" name="Straight Arrow Connector 15"/>
+          <p:cNvCxnSpPr>
+            <a:stCxn id="34" idx="2"/>
+            <a:endCxn id="8" idx="0"/>
+          </p:cNvCxnSpPr>
+          <p:nvPr/>
+        </p:nvCxnSpPr>
+        <p:spPr>
+          <a:xfrm flipH="1">
+            <a:off x="3092956" y="1414630"/>
+            <a:ext cx="686101" cy="315747"/>
+          </a:xfrm>
+          <a:prstGeom prst="straightConnector1">
+            <a:avLst/>
+          </a:prstGeom>
+          <a:ln>
+            <a:solidFill>
+              <a:schemeClr val="tx1"/>
+            </a:solidFill>
+            <a:headEnd type="triangle"/>
+            <a:tailEnd type="none"/>
+          </a:ln>
+        </p:spPr>
+        <p:style>
+          <a:lnRef idx="2">
+            <a:schemeClr val="accent1"/>
+          </a:lnRef>
+          <a:fillRef idx="0">
+            <a:schemeClr val="accent1"/>
+          </a:fillRef>
+          <a:effectRef idx="1">
+            <a:schemeClr val="accent1"/>
+          </a:effectRef>
+          <a:fontRef idx="minor">
+            <a:schemeClr val="tx1"/>
+          </a:fontRef>
+        </p:style>
+      </p:cxnSp>
     </p:spTree>
     <p:extLst>
       <p:ext uri="{BB962C8B-B14F-4D97-AF65-F5344CB8AC3E}">

</xml_diff>